<commit_message>
removed snippet of NAND
</commit_message>
<xml_diff>
--- a/FPGA Pins.pptx
+++ b/FPGA Pins.pptx
@@ -218,7 +218,7 @@
           <a:p>
             <a:fld id="{A1D86082-5ED5-4107-A5A9-98A617540F08}" type="datetimeFigureOut">
               <a:rPr lang="en-US" smtClean="0"/>
-              <a:t>2/28/2020</a:t>
+              <a:t>12/4/2020</a:t>
             </a:fld>
             <a:endParaRPr lang="en-US"/>
           </a:p>
@@ -716,7 +716,7 @@
           <a:p>
             <a:fld id="{623ED2CB-424D-41FD-8670-8FE72FA18CA2}" type="datetimeFigureOut">
               <a:rPr lang="en-US" smtClean="0"/>
-              <a:t>2/28/2020</a:t>
+              <a:t>12/4/2020</a:t>
             </a:fld>
             <a:endParaRPr lang="en-US"/>
           </a:p>
@@ -914,7 +914,7 @@
           <a:p>
             <a:fld id="{623ED2CB-424D-41FD-8670-8FE72FA18CA2}" type="datetimeFigureOut">
               <a:rPr lang="en-US" smtClean="0"/>
-              <a:t>2/28/2020</a:t>
+              <a:t>12/4/2020</a:t>
             </a:fld>
             <a:endParaRPr lang="en-US"/>
           </a:p>
@@ -1122,7 +1122,7 @@
           <a:p>
             <a:fld id="{623ED2CB-424D-41FD-8670-8FE72FA18CA2}" type="datetimeFigureOut">
               <a:rPr lang="en-US" smtClean="0"/>
-              <a:t>2/28/2020</a:t>
+              <a:t>12/4/2020</a:t>
             </a:fld>
             <a:endParaRPr lang="en-US"/>
           </a:p>
@@ -1320,7 +1320,7 @@
           <a:p>
             <a:fld id="{623ED2CB-424D-41FD-8670-8FE72FA18CA2}" type="datetimeFigureOut">
               <a:rPr lang="en-US" smtClean="0"/>
-              <a:t>2/28/2020</a:t>
+              <a:t>12/4/2020</a:t>
             </a:fld>
             <a:endParaRPr lang="en-US"/>
           </a:p>
@@ -1595,7 +1595,7 @@
           <a:p>
             <a:fld id="{623ED2CB-424D-41FD-8670-8FE72FA18CA2}" type="datetimeFigureOut">
               <a:rPr lang="en-US" smtClean="0"/>
-              <a:t>2/28/2020</a:t>
+              <a:t>12/4/2020</a:t>
             </a:fld>
             <a:endParaRPr lang="en-US"/>
           </a:p>
@@ -1860,7 +1860,7 @@
           <a:p>
             <a:fld id="{623ED2CB-424D-41FD-8670-8FE72FA18CA2}" type="datetimeFigureOut">
               <a:rPr lang="en-US" smtClean="0"/>
-              <a:t>2/28/2020</a:t>
+              <a:t>12/4/2020</a:t>
             </a:fld>
             <a:endParaRPr lang="en-US"/>
           </a:p>
@@ -2272,7 +2272,7 @@
           <a:p>
             <a:fld id="{623ED2CB-424D-41FD-8670-8FE72FA18CA2}" type="datetimeFigureOut">
               <a:rPr lang="en-US" smtClean="0"/>
-              <a:t>2/28/2020</a:t>
+              <a:t>12/4/2020</a:t>
             </a:fld>
             <a:endParaRPr lang="en-US"/>
           </a:p>
@@ -2413,7 +2413,7 @@
           <a:p>
             <a:fld id="{623ED2CB-424D-41FD-8670-8FE72FA18CA2}" type="datetimeFigureOut">
               <a:rPr lang="en-US" smtClean="0"/>
-              <a:t>2/28/2020</a:t>
+              <a:t>12/4/2020</a:t>
             </a:fld>
             <a:endParaRPr lang="en-US"/>
           </a:p>
@@ -2526,7 +2526,7 @@
           <a:p>
             <a:fld id="{623ED2CB-424D-41FD-8670-8FE72FA18CA2}" type="datetimeFigureOut">
               <a:rPr lang="en-US" smtClean="0"/>
-              <a:t>2/28/2020</a:t>
+              <a:t>12/4/2020</a:t>
             </a:fld>
             <a:endParaRPr lang="en-US"/>
           </a:p>
@@ -2837,7 +2837,7 @@
           <a:p>
             <a:fld id="{623ED2CB-424D-41FD-8670-8FE72FA18CA2}" type="datetimeFigureOut">
               <a:rPr lang="en-US" smtClean="0"/>
-              <a:t>2/28/2020</a:t>
+              <a:t>12/4/2020</a:t>
             </a:fld>
             <a:endParaRPr lang="en-US"/>
           </a:p>
@@ -3125,7 +3125,7 @@
           <a:p>
             <a:fld id="{623ED2CB-424D-41FD-8670-8FE72FA18CA2}" type="datetimeFigureOut">
               <a:rPr lang="en-US" smtClean="0"/>
-              <a:t>2/28/2020</a:t>
+              <a:t>12/4/2020</a:t>
             </a:fld>
             <a:endParaRPr lang="en-US"/>
           </a:p>
@@ -3366,7 +3366,7 @@
           <a:p>
             <a:fld id="{623ED2CB-424D-41FD-8670-8FE72FA18CA2}" type="datetimeFigureOut">
               <a:rPr lang="en-US" smtClean="0"/>
-              <a:t>2/28/2020</a:t>
+              <a:t>12/4/2020</a:t>
             </a:fld>
             <a:endParaRPr lang="en-US"/>
           </a:p>
@@ -3797,10 +3797,10 @@
         </p:nvGrpSpPr>
         <p:grpSpPr>
           <a:xfrm>
-            <a:off x="3668724" y="1101805"/>
-            <a:ext cx="6490342" cy="4683236"/>
-            <a:chOff x="3088291" y="1150288"/>
-            <a:chExt cx="6490342" cy="4683236"/>
+            <a:off x="2570678" y="1106336"/>
+            <a:ext cx="6661109" cy="4689579"/>
+            <a:chOff x="2917524" y="1143945"/>
+            <a:chExt cx="6661109" cy="4689579"/>
           </a:xfrm>
         </p:grpSpPr>
         <p:grpSp>
@@ -4633,18 +4633,17 @@
             </p:cNvPr>
             <p:cNvCxnSpPr>
               <a:cxnSpLocks/>
+              <a:endCxn id="44" idx="2"/>
             </p:cNvCxnSpPr>
             <p:nvPr/>
           </p:nvCxnSpPr>
           <p:spPr>
-            <a:xfrm rot="5400000" flipH="1" flipV="1">
-              <a:off x="7458743" y="1178392"/>
-              <a:ext cx="1808549" cy="1752343"/>
+            <a:xfrm flipV="1">
+              <a:off x="7486846" y="1143945"/>
+              <a:ext cx="2001779" cy="1814894"/>
             </a:xfrm>
-            <a:prstGeom prst="bentConnector3">
-              <a:avLst>
-                <a:gd name="adj1" fmla="val -560"/>
-              </a:avLst>
+            <a:prstGeom prst="bentConnector2">
+              <a:avLst/>
             </a:prstGeom>
             <a:ln w="28575">
               <a:solidFill>
@@ -4686,8 +4685,8 @@
           </p:nvCxnSpPr>
           <p:spPr>
             <a:xfrm rot="16200000" flipV="1">
-              <a:off x="3188884" y="1573725"/>
-              <a:ext cx="649683" cy="850870"/>
+              <a:off x="3101766" y="1486606"/>
+              <a:ext cx="653153" cy="1021637"/>
             </a:xfrm>
             <a:prstGeom prst="bentConnector2">
               <a:avLst/>
@@ -4779,14 +4778,14 @@
           <p:nvPr>
             <p:extLst>
               <p:ext uri="{D42A27DB-BD31-4B8C-83A1-F6EECF244321}">
-                <p14:modId xmlns:p14="http://schemas.microsoft.com/office/powerpoint/2010/main" val="526702005"/>
+                <p14:modId xmlns:p14="http://schemas.microsoft.com/office/powerpoint/2010/main" val="1982476240"/>
               </p:ext>
             </p:extLst>
           </p:nvPr>
         </p:nvGraphicFramePr>
         <p:xfrm>
-          <a:off x="6865935" y="1210885"/>
-          <a:ext cx="2772000" cy="822960"/>
+          <a:off x="6101482" y="1212518"/>
+          <a:ext cx="2891520" cy="822960"/>
         </p:xfrm>
         <a:graphic>
           <a:graphicData uri="http://schemas.openxmlformats.org/drawingml/2006/table">
@@ -4802,7 +4801,7 @@
                     </a:ext>
                   </a:extLst>
                 </a:gridCol>
-                <a:gridCol w="612000">
+                <a:gridCol w="731520">
                   <a:extLst>
                     <a:ext uri="{9D8B030D-6E8A-4147-A177-3AD203B41FA5}">
                       <a16:colId xmlns:a16="http://schemas.microsoft.com/office/drawing/2014/main" val="927107501"/>
@@ -5200,7 +5199,7 @@
                     <a:p>
                       <a:pPr algn="ctr"/>
                       <a:r>
-                        <a:rPr lang="en-US" sz="500" dirty="0">
+                        <a:rPr lang="en-US" sz="600" dirty="0">
                           <a:solidFill>
                             <a:schemeClr val="tx1"/>
                           </a:solidFill>
@@ -5211,7 +5210,7 @@
                     <a:p>
                       <a:pPr algn="ctr"/>
                       <a:r>
-                        <a:rPr lang="en-US" sz="500" dirty="0">
+                        <a:rPr lang="en-US" sz="600" dirty="0">
                           <a:solidFill>
                             <a:schemeClr val="tx1"/>
                           </a:solidFill>
@@ -5233,7 +5232,7 @@
                     <a:p>
                       <a:pPr algn="ctr"/>
                       <a:r>
-                        <a:rPr lang="en-US" sz="500" dirty="0">
+                        <a:rPr lang="en-US" sz="600" dirty="0">
                           <a:solidFill>
                             <a:schemeClr val="tx1"/>
                           </a:solidFill>
@@ -5255,7 +5254,7 @@
                     <a:p>
                       <a:pPr algn="ctr"/>
                       <a:r>
-                        <a:rPr lang="en-US" sz="500" dirty="0">
+                        <a:rPr lang="en-US" sz="600" dirty="0">
                           <a:solidFill>
                             <a:schemeClr val="tx1"/>
                           </a:solidFill>
@@ -5277,7 +5276,7 @@
                     <a:p>
                       <a:pPr algn="ctr"/>
                       <a:r>
-                        <a:rPr lang="en-US" sz="500" dirty="0">
+                        <a:rPr lang="en-US" sz="600" dirty="0">
                           <a:solidFill>
                             <a:schemeClr val="tx1"/>
                           </a:solidFill>
@@ -5317,14 +5316,14 @@
           <p:nvPr>
             <p:extLst>
               <p:ext uri="{D42A27DB-BD31-4B8C-83A1-F6EECF244321}">
-                <p14:modId xmlns:p14="http://schemas.microsoft.com/office/powerpoint/2010/main" val="386508445"/>
+                <p14:modId xmlns:p14="http://schemas.microsoft.com/office/powerpoint/2010/main" val="2529909182"/>
               </p:ext>
             </p:extLst>
           </p:nvPr>
         </p:nvGraphicFramePr>
         <p:xfrm>
-          <a:off x="5191371" y="1210951"/>
-          <a:ext cx="1548000" cy="822960"/>
+          <a:off x="4215169" y="1221758"/>
+          <a:ext cx="1820160" cy="822960"/>
         </p:xfrm>
         <a:graphic>
           <a:graphicData uri="http://schemas.openxmlformats.org/drawingml/2006/table">
@@ -5340,14 +5339,14 @@
                     </a:ext>
                   </a:extLst>
                 </a:gridCol>
-                <a:gridCol w="504000">
+                <a:gridCol w="640080">
                   <a:extLst>
                     <a:ext uri="{9D8B030D-6E8A-4147-A177-3AD203B41FA5}">
                       <a16:colId xmlns:a16="http://schemas.microsoft.com/office/drawing/2014/main" val="927107501"/>
                     </a:ext>
                   </a:extLst>
                 </a:gridCol>
-                <a:gridCol w="504000">
+                <a:gridCol w="640080">
                   <a:extLst>
                     <a:ext uri="{9D8B030D-6E8A-4147-A177-3AD203B41FA5}">
                       <a16:colId xmlns:a16="http://schemas.microsoft.com/office/drawing/2014/main" val="1091685481"/>
@@ -5598,7 +5597,7 @@
                     <a:p>
                       <a:pPr algn="ctr"/>
                       <a:r>
-                        <a:rPr lang="en-US" sz="500" dirty="0">
+                        <a:rPr lang="en-US" sz="600" dirty="0">
                           <a:solidFill>
                             <a:schemeClr val="tx1"/>
                           </a:solidFill>
@@ -5620,7 +5619,7 @@
                     <a:p>
                       <a:pPr algn="ctr"/>
                       <a:r>
-                        <a:rPr lang="en-US" sz="500" dirty="0">
+                        <a:rPr lang="en-US" sz="600" dirty="0">
                           <a:solidFill>
                             <a:schemeClr val="tx1"/>
                           </a:solidFill>
@@ -5660,14 +5659,14 @@
           <p:nvPr>
             <p:extLst>
               <p:ext uri="{D42A27DB-BD31-4B8C-83A1-F6EECF244321}">
-                <p14:modId xmlns:p14="http://schemas.microsoft.com/office/powerpoint/2010/main" val="1479067043"/>
+                <p14:modId xmlns:p14="http://schemas.microsoft.com/office/powerpoint/2010/main" val="2164090722"/>
               </p:ext>
             </p:extLst>
           </p:nvPr>
         </p:nvGraphicFramePr>
         <p:xfrm>
-          <a:off x="524625" y="233305"/>
-          <a:ext cx="5796000" cy="868680"/>
+          <a:off x="138173" y="194428"/>
+          <a:ext cx="6035040" cy="914400"/>
         </p:xfrm>
         <a:graphic>
           <a:graphicData uri="http://schemas.openxmlformats.org/drawingml/2006/table">
@@ -5683,7 +5682,7 @@
                     </a:ext>
                   </a:extLst>
                 </a:gridCol>
-                <a:gridCol w="612000">
+                <a:gridCol w="731520">
                   <a:extLst>
                     <a:ext uri="{9D8B030D-6E8A-4147-A177-3AD203B41FA5}">
                       <a16:colId xmlns:a16="http://schemas.microsoft.com/office/drawing/2014/main" val="426556918"/>
@@ -5725,7 +5724,7 @@
                     </a:ext>
                   </a:extLst>
                 </a:gridCol>
-                <a:gridCol w="612000">
+                <a:gridCol w="731520">
                   <a:extLst>
                     <a:ext uri="{9D8B030D-6E8A-4147-A177-3AD203B41FA5}">
                       <a16:colId xmlns:a16="http://schemas.microsoft.com/office/drawing/2014/main" val="1050134289"/>
@@ -6464,14 +6463,14 @@
                     <a:p>
                       <a:pPr algn="ctr"/>
                       <a:r>
-                        <a:rPr lang="en-US" sz="500" dirty="0"/>
+                        <a:rPr lang="en-US" sz="600" dirty="0"/>
                         <a:t>MSIO120NB4/</a:t>
                       </a:r>
                     </a:p>
                     <a:p>
                       <a:pPr algn="ctr"/>
                       <a:r>
-                        <a:rPr lang="en-US" sz="500" dirty="0"/>
+                        <a:rPr lang="en-US" sz="600" dirty="0"/>
                         <a:t>CCC_SW0_CLKI2</a:t>
                       </a:r>
                     </a:p>
@@ -6505,7 +6504,7 @@
                         <a:defRPr/>
                       </a:pPr>
                       <a:r>
-                        <a:rPr lang="en-US" sz="500" dirty="0"/>
+                        <a:rPr lang="en-US" sz="600" dirty="0"/>
                         <a:t>MSIO130PB4</a:t>
                       </a:r>
                     </a:p>
@@ -6528,7 +6527,7 @@
                         <a:defRPr/>
                       </a:pPr>
                       <a:r>
-                        <a:rPr lang="en-US" sz="500" dirty="0"/>
+                        <a:rPr lang="en-US" sz="600" dirty="0"/>
                         <a:t>VCCC_SE0_CLKI</a:t>
                       </a:r>
                     </a:p>
@@ -6562,7 +6561,7 @@
                         <a:defRPr/>
                       </a:pPr>
                       <a:r>
-                        <a:rPr lang="en-US" sz="700" dirty="0"/>
+                        <a:rPr lang="en-US" sz="600" dirty="0"/>
                         <a:t>3.3V</a:t>
                       </a:r>
                     </a:p>
@@ -6596,7 +6595,7 @@
                         <a:defRPr/>
                       </a:pPr>
                       <a:r>
-                        <a:rPr lang="en-US" sz="700" dirty="0"/>
+                        <a:rPr lang="en-US" sz="600" dirty="0"/>
                         <a:t>-</a:t>
                       </a:r>
                     </a:p>
@@ -6630,7 +6629,7 @@
                         <a:defRPr/>
                       </a:pPr>
                       <a:r>
-                        <a:rPr lang="en-US" sz="500" dirty="0"/>
+                        <a:rPr lang="en-US" sz="600" dirty="0"/>
                         <a:t>MSIO143NB4</a:t>
                       </a:r>
                     </a:p>
@@ -6664,7 +6663,7 @@
                         <a:defRPr/>
                       </a:pPr>
                       <a:r>
-                        <a:rPr lang="en-US" sz="500" dirty="0"/>
+                        <a:rPr lang="en-US" sz="600" dirty="0"/>
                         <a:t>MSIO143PB4</a:t>
                       </a:r>
                     </a:p>
@@ -6698,7 +6697,7 @@
                         <a:defRPr/>
                       </a:pPr>
                       <a:r>
-                        <a:rPr lang="en-US" sz="500" dirty="0"/>
+                        <a:rPr lang="en-US" sz="600" dirty="0"/>
                         <a:t>MSIO133PB4/</a:t>
                       </a:r>
                     </a:p>
@@ -6721,7 +6720,7 @@
                         <a:defRPr/>
                       </a:pPr>
                       <a:r>
-                        <a:rPr lang="en-US" sz="500" dirty="0"/>
+                        <a:rPr lang="en-US" sz="600" dirty="0"/>
                         <a:t>BG15/</a:t>
                       </a:r>
                     </a:p>
@@ -6744,7 +6743,7 @@
                         <a:defRPr/>
                       </a:pPr>
                       <a:r>
-                        <a:rPr lang="en-US" sz="500" dirty="0"/>
+                        <a:rPr lang="en-US" sz="600" dirty="0"/>
                         <a:t>VCCC_SE1_CLKI</a:t>
                       </a:r>
                     </a:p>
@@ -6778,7 +6777,7 @@
                         <a:defRPr/>
                       </a:pPr>
                       <a:r>
-                        <a:rPr lang="en-US" sz="500" dirty="0"/>
+                        <a:rPr lang="en-US" sz="600" dirty="0"/>
                         <a:t>MSIO133NB4</a:t>
                       </a:r>
                     </a:p>
@@ -6812,7 +6811,7 @@
                         <a:defRPr/>
                       </a:pPr>
                       <a:r>
-                        <a:rPr lang="en-US" sz="500" dirty="0"/>
+                        <a:rPr lang="en-US" sz="600" dirty="0"/>
                         <a:t>MSIO132NB4</a:t>
                       </a:r>
                     </a:p>
@@ -6846,7 +6845,7 @@
                         <a:defRPr/>
                       </a:pPr>
                       <a:r>
-                        <a:rPr lang="en-US" sz="500" dirty="0"/>
+                        <a:rPr lang="en-US" sz="600" dirty="0"/>
                         <a:t>MSIO132PB4</a:t>
                       </a:r>
                     </a:p>
@@ -6882,13 +6881,13 @@
           <p:nvPr>
             <p:extLst>
               <p:ext uri="{D42A27DB-BD31-4B8C-83A1-F6EECF244321}">
-                <p14:modId xmlns:p14="http://schemas.microsoft.com/office/powerpoint/2010/main" val="2442043997"/>
+                <p14:modId xmlns:p14="http://schemas.microsoft.com/office/powerpoint/2010/main" val="2476676450"/>
               </p:ext>
             </p:extLst>
           </p:nvPr>
         </p:nvGraphicFramePr>
         <p:xfrm>
-          <a:off x="2369095" y="1345584"/>
+          <a:off x="1239085" y="1426273"/>
           <a:ext cx="1296000" cy="2651760"/>
         </p:xfrm>
         <a:graphic>
@@ -7091,7 +7090,7 @@
                     <a:p>
                       <a:pPr algn="ctr"/>
                       <a:r>
-                        <a:rPr lang="en-US" sz="500" dirty="0"/>
+                        <a:rPr lang="en-US" sz="600" dirty="0"/>
                         <a:t>MSIO3PB2</a:t>
                       </a:r>
                     </a:p>
@@ -7140,7 +7139,7 @@
                     <a:p>
                       <a:pPr algn="ctr"/>
                       <a:r>
-                        <a:rPr lang="en-US" sz="500" dirty="0"/>
+                        <a:rPr lang="en-US" sz="600" dirty="0"/>
                         <a:t>MSIO3NB2</a:t>
                       </a:r>
                     </a:p>
@@ -7189,7 +7188,7 @@
                     <a:p>
                       <a:pPr algn="ctr"/>
                       <a:r>
-                        <a:rPr lang="en-US" sz="500" dirty="0"/>
+                        <a:rPr lang="en-US" sz="600" dirty="0"/>
                         <a:t>MSIO2PB2</a:t>
                       </a:r>
                     </a:p>
@@ -7238,7 +7237,7 @@
                     <a:p>
                       <a:pPr algn="ctr"/>
                       <a:r>
-                        <a:rPr lang="en-US" sz="500" dirty="0"/>
+                        <a:rPr lang="en-US" sz="600" dirty="0"/>
                         <a:t>MSIO2NB2</a:t>
                       </a:r>
                     </a:p>
@@ -7287,7 +7286,7 @@
                     <a:p>
                       <a:pPr algn="ctr"/>
                       <a:r>
-                        <a:rPr lang="en-US" sz="500" dirty="0"/>
+                        <a:rPr lang="en-US" sz="600" dirty="0"/>
                         <a:t>MSIO1PB2</a:t>
                       </a:r>
                     </a:p>
@@ -7336,7 +7335,7 @@
                     <a:p>
                       <a:pPr algn="ctr"/>
                       <a:r>
-                        <a:rPr lang="en-US" sz="500" dirty="0"/>
+                        <a:rPr lang="en-US" sz="600" dirty="0"/>
                         <a:t>MSIO1NB2</a:t>
                       </a:r>
                     </a:p>
@@ -7385,7 +7384,7 @@
                     <a:p>
                       <a:pPr algn="ctr"/>
                       <a:r>
-                        <a:rPr lang="en-US" sz="500" dirty="0"/>
+                        <a:rPr lang="en-US" sz="600" dirty="0"/>
                         <a:t>MSIO0PB2</a:t>
                       </a:r>
                     </a:p>
@@ -7434,7 +7433,7 @@
                     <a:p>
                       <a:pPr algn="ctr"/>
                       <a:r>
-                        <a:rPr lang="en-US" sz="500" dirty="0"/>
+                        <a:rPr lang="en-US" sz="600" dirty="0"/>
                         <a:t>MSIO0NB2</a:t>
                       </a:r>
                     </a:p>
@@ -7662,14 +7661,14 @@
           <p:nvPr>
             <p:extLst>
               <p:ext uri="{D42A27DB-BD31-4B8C-83A1-F6EECF244321}">
-                <p14:modId xmlns:p14="http://schemas.microsoft.com/office/powerpoint/2010/main" val="4198123362"/>
+                <p14:modId xmlns:p14="http://schemas.microsoft.com/office/powerpoint/2010/main" val="3778765814"/>
               </p:ext>
             </p:extLst>
           </p:nvPr>
         </p:nvGraphicFramePr>
         <p:xfrm>
-          <a:off x="10163044" y="1535812"/>
-          <a:ext cx="1656000" cy="1889760"/>
+          <a:off x="9235765" y="1546686"/>
+          <a:ext cx="2036160" cy="1828800"/>
         </p:xfrm>
         <a:graphic>
           <a:graphicData uri="http://schemas.openxmlformats.org/drawingml/2006/table">
@@ -7692,7 +7691,7 @@
                     </a:ext>
                   </a:extLst>
                 </a:gridCol>
-                <a:gridCol w="900000">
+                <a:gridCol w="1280160">
                   <a:extLst>
                     <a:ext uri="{9D8B030D-6E8A-4147-A177-3AD203B41FA5}">
                       <a16:colId xmlns:a16="http://schemas.microsoft.com/office/drawing/2014/main" val="3825892234"/>
@@ -7969,7 +7968,7 @@
                     <a:p>
                       <a:pPr algn="ctr"/>
                       <a:r>
-                        <a:rPr lang="en-US" sz="500" dirty="0"/>
+                        <a:rPr lang="en-US" sz="600" dirty="0"/>
                         <a:t>MSIO145NB4</a:t>
                       </a:r>
                     </a:p>
@@ -8018,7 +8017,7 @@
                     <a:p>
                       <a:pPr algn="ctr"/>
                       <a:r>
-                        <a:rPr lang="en-US" sz="500" dirty="0"/>
+                        <a:rPr lang="en-US" sz="600" dirty="0"/>
                         <a:t>MSIO145PB4</a:t>
                       </a:r>
                     </a:p>
@@ -8067,7 +8066,7 @@
                     <a:p>
                       <a:pPr algn="ctr"/>
                       <a:r>
-                        <a:rPr lang="en-US" sz="500" dirty="0"/>
+                        <a:rPr lang="en-US" sz="600" dirty="0"/>
                         <a:t>MSIO138NB4</a:t>
                       </a:r>
                     </a:p>
@@ -8116,7 +8115,7 @@
                     <a:p>
                       <a:pPr algn="ctr"/>
                       <a:r>
-                        <a:rPr lang="en-US" sz="500" dirty="0"/>
+                        <a:rPr lang="en-US" sz="600" dirty="0"/>
                         <a:t>MSIO138PB4</a:t>
                       </a:r>
                     </a:p>
@@ -8165,7 +8164,7 @@
                     <a:p>
                       <a:pPr algn="ctr"/>
                       <a:r>
-                        <a:rPr lang="en-US" sz="500" dirty="0"/>
+                        <a:rPr lang="en-US" sz="600" dirty="0"/>
                         <a:t>MSIO134NB4</a:t>
                       </a:r>
                     </a:p>
@@ -8214,15 +8213,8 @@
                     <a:p>
                       <a:pPr algn="ctr"/>
                       <a:r>
-                        <a:rPr lang="en-US" sz="500" dirty="0"/>
-                        <a:t>A/D Converter MCP3903-E/</a:t>
-                      </a:r>
-                    </a:p>
-                    <a:p>
-                      <a:pPr algn="ctr"/>
-                      <a:r>
-                        <a:rPr lang="en-US" sz="500" dirty="0"/>
-                        <a:t>SS CH0</a:t>
+                        <a:rPr lang="en-US" sz="600" dirty="0"/>
+                        <a:t>A/D Converter MCP3903-E/SS CH0</a:t>
                       </a:r>
                     </a:p>
                   </a:txBody>
@@ -8253,13 +8245,13 @@
           <p:nvPr>
             <p:extLst>
               <p:ext uri="{D42A27DB-BD31-4B8C-83A1-F6EECF244321}">
-                <p14:modId xmlns:p14="http://schemas.microsoft.com/office/powerpoint/2010/main" val="3196366051"/>
+                <p14:modId xmlns:p14="http://schemas.microsoft.com/office/powerpoint/2010/main" val="547899971"/>
               </p:ext>
             </p:extLst>
           </p:nvPr>
         </p:nvGraphicFramePr>
         <p:xfrm>
-          <a:off x="10163044" y="3686698"/>
+          <a:off x="9235765" y="3697572"/>
           <a:ext cx="1656000" cy="1828800"/>
         </p:xfrm>
         <a:graphic>
@@ -8560,7 +8552,7 @@
                     <a:p>
                       <a:pPr algn="ctr"/>
                       <a:r>
-                        <a:rPr lang="en-US" sz="500" dirty="0"/>
+                        <a:rPr lang="en-US" sz="600" dirty="0"/>
                         <a:t>MSIO120PB4</a:t>
                       </a:r>
                     </a:p>
@@ -8609,7 +8601,7 @@
                     <a:p>
                       <a:pPr algn="ctr"/>
                       <a:r>
-                        <a:rPr lang="en-US" sz="500" dirty="0"/>
+                        <a:rPr lang="en-US" sz="600" dirty="0"/>
                         <a:t>MSIO122PB4</a:t>
                       </a:r>
                     </a:p>
@@ -8658,7 +8650,7 @@
                     <a:p>
                       <a:pPr algn="ctr"/>
                       <a:r>
-                        <a:rPr lang="en-US" sz="500" dirty="0"/>
+                        <a:rPr lang="en-US" sz="600" dirty="0"/>
                         <a:t>MSIO122NB4</a:t>
                       </a:r>
                     </a:p>
@@ -8707,7 +8699,7 @@
                     <a:p>
                       <a:pPr algn="ctr"/>
                       <a:r>
-                        <a:rPr lang="en-US" sz="500" dirty="0"/>
+                        <a:rPr lang="en-US" sz="600" dirty="0"/>
                         <a:t>MSIO126PB4</a:t>
                       </a:r>
                     </a:p>
@@ -8756,7 +8748,7 @@
                     <a:p>
                       <a:pPr algn="ctr"/>
                       <a:r>
-                        <a:rPr lang="en-US" sz="500" dirty="0"/>
+                        <a:rPr lang="en-US" sz="600" dirty="0"/>
                         <a:t>MSIO130NB4</a:t>
                       </a:r>
                     </a:p>
@@ -8805,7 +8797,7 @@
                     <a:p>
                       <a:pPr algn="ctr"/>
                       <a:r>
-                        <a:rPr lang="en-US" sz="500" dirty="0"/>
+                        <a:rPr lang="en-US" sz="600" dirty="0"/>
                         <a:t>MSIO131NB4</a:t>
                       </a:r>
                     </a:p>
@@ -8837,14 +8829,14 @@
           <p:nvPr>
             <p:extLst>
               <p:ext uri="{D42A27DB-BD31-4B8C-83A1-F6EECF244321}">
-                <p14:modId xmlns:p14="http://schemas.microsoft.com/office/powerpoint/2010/main" val="3032914743"/>
+                <p14:modId xmlns:p14="http://schemas.microsoft.com/office/powerpoint/2010/main" val="1085086002"/>
               </p:ext>
             </p:extLst>
           </p:nvPr>
         </p:nvGraphicFramePr>
         <p:xfrm>
-          <a:off x="2192990" y="5798279"/>
-          <a:ext cx="3702276" cy="868680"/>
+          <a:off x="1228677" y="5874507"/>
+          <a:ext cx="3785796" cy="914400"/>
         </p:xfrm>
         <a:graphic>
           <a:graphicData uri="http://schemas.openxmlformats.org/drawingml/2006/table">
@@ -8874,7 +8866,7 @@
                     </a:ext>
                   </a:extLst>
                 </a:gridCol>
-                <a:gridCol w="648000">
+                <a:gridCol w="731520">
                   <a:extLst>
                     <a:ext uri="{9D8B030D-6E8A-4147-A177-3AD203B41FA5}">
                       <a16:colId xmlns:a16="http://schemas.microsoft.com/office/drawing/2014/main" val="639144265"/>
@@ -9569,7 +9561,7 @@
                         <a:defRPr/>
                       </a:pPr>
                       <a:r>
-                        <a:rPr lang="en-US" sz="500" dirty="0"/>
+                        <a:rPr lang="en-US" sz="600" dirty="0"/>
                         <a:t>MSIO07PB7/</a:t>
                       </a:r>
                     </a:p>
@@ -9592,7 +9584,7 @@
                         <a:defRPr/>
                       </a:pPr>
                       <a:r>
-                        <a:rPr lang="en-US" sz="500" dirty="0"/>
+                        <a:rPr lang="en-US" sz="600" dirty="0"/>
                         <a:t>GB2/</a:t>
                       </a:r>
                     </a:p>
@@ -9615,7 +9607,7 @@
                         <a:defRPr/>
                       </a:pPr>
                       <a:r>
-                        <a:rPr lang="en-US" sz="500" dirty="0"/>
+                        <a:rPr lang="en-US" sz="600" dirty="0"/>
                         <a:t>CCC_NW0_CLKI1</a:t>
                       </a:r>
                     </a:p>
@@ -9649,7 +9641,7 @@
                         <a:defRPr/>
                       </a:pPr>
                       <a:r>
-                        <a:rPr lang="en-US" sz="500" dirty="0"/>
+                        <a:rPr lang="en-US" sz="600" dirty="0"/>
                         <a:t>IOREF</a:t>
                       </a:r>
                     </a:p>
@@ -9821,14 +9813,14 @@
           <p:nvPr>
             <p:extLst>
               <p:ext uri="{D42A27DB-BD31-4B8C-83A1-F6EECF244321}">
-                <p14:modId xmlns:p14="http://schemas.microsoft.com/office/powerpoint/2010/main" val="3530929524"/>
+                <p14:modId xmlns:p14="http://schemas.microsoft.com/office/powerpoint/2010/main" val="1737166243"/>
               </p:ext>
             </p:extLst>
           </p:nvPr>
         </p:nvGraphicFramePr>
         <p:xfrm>
-          <a:off x="6096083" y="5798279"/>
-          <a:ext cx="5724000" cy="822960"/>
+          <a:off x="5131770" y="5874507"/>
+          <a:ext cx="5724000" cy="914400"/>
         </p:xfrm>
         <a:graphic>
           <a:graphicData uri="http://schemas.openxmlformats.org/drawingml/2006/table">
@@ -10345,14 +10337,14 @@
                     <a:p>
                       <a:pPr algn="ctr"/>
                       <a:r>
-                        <a:rPr lang="en-US" sz="500" dirty="0"/>
+                        <a:rPr lang="en-US" sz="600" dirty="0"/>
                         <a:t>A/D Converter MCP3903/</a:t>
                       </a:r>
                     </a:p>
                     <a:p>
                       <a:pPr algn="ctr"/>
                       <a:r>
-                        <a:rPr lang="en-US" sz="500" dirty="0"/>
+                        <a:rPr lang="en-US" sz="600" dirty="0"/>
                         <a:t>SS CH0</a:t>
                       </a:r>
                     </a:p>
@@ -10370,14 +10362,14 @@
                     <a:p>
                       <a:pPr algn="ctr"/>
                       <a:r>
-                        <a:rPr lang="en-US" sz="500" dirty="0"/>
+                        <a:rPr lang="en-US" sz="600" dirty="0"/>
                         <a:t>A/D Converter MCP3903/</a:t>
                       </a:r>
                     </a:p>
                     <a:p>
                       <a:pPr algn="ctr"/>
                       <a:r>
-                        <a:rPr lang="en-US" sz="500" dirty="0"/>
+                        <a:rPr lang="en-US" sz="600" dirty="0"/>
                         <a:t>SS CH1</a:t>
                       </a:r>
                     </a:p>
@@ -10395,14 +10387,14 @@
                     <a:p>
                       <a:pPr algn="ctr"/>
                       <a:r>
-                        <a:rPr lang="en-US" sz="500" dirty="0"/>
+                        <a:rPr lang="en-US" sz="600" dirty="0"/>
                         <a:t>A/D Converter MCP3903/</a:t>
                       </a:r>
                     </a:p>
                     <a:p>
                       <a:pPr algn="ctr"/>
                       <a:r>
-                        <a:rPr lang="en-US" sz="500" dirty="0"/>
+                        <a:rPr lang="en-US" sz="600" dirty="0"/>
                         <a:t>SS CH2</a:t>
                       </a:r>
                     </a:p>
@@ -10420,14 +10412,14 @@
                     <a:p>
                       <a:pPr algn="ctr"/>
                       <a:r>
-                        <a:rPr lang="en-US" sz="500" dirty="0"/>
+                        <a:rPr lang="en-US" sz="600" dirty="0"/>
                         <a:t>A/D Converter MCP3903/</a:t>
                       </a:r>
                     </a:p>
                     <a:p>
                       <a:pPr algn="ctr"/>
                       <a:r>
-                        <a:rPr lang="en-US" sz="500" dirty="0"/>
+                        <a:rPr lang="en-US" sz="600" dirty="0"/>
                         <a:t>SS CH3</a:t>
                       </a:r>
                     </a:p>
@@ -10445,14 +10437,14 @@
                     <a:p>
                       <a:pPr algn="ctr"/>
                       <a:r>
-                        <a:rPr lang="en-US" sz="500" dirty="0"/>
+                        <a:rPr lang="en-US" sz="600" dirty="0"/>
                         <a:t>A/D Converter MCP3903/</a:t>
                       </a:r>
                     </a:p>
                     <a:p>
                       <a:pPr algn="ctr"/>
                       <a:r>
-                        <a:rPr lang="en-US" sz="500" dirty="0"/>
+                        <a:rPr lang="en-US" sz="600" dirty="0"/>
                         <a:t>SS CH4</a:t>
                       </a:r>
                     </a:p>
@@ -10470,14 +10462,14 @@
                     <a:p>
                       <a:pPr algn="ctr"/>
                       <a:r>
-                        <a:rPr lang="en-US" sz="500" dirty="0"/>
+                        <a:rPr lang="en-US" sz="600" dirty="0"/>
                         <a:t>A/D Converter MCP3903/</a:t>
                       </a:r>
                     </a:p>
                     <a:p>
                       <a:pPr algn="ctr"/>
                       <a:r>
-                        <a:rPr lang="en-US" sz="500" dirty="0"/>
+                        <a:rPr lang="en-US" sz="600" dirty="0"/>
                         <a:t>SS CH5</a:t>
                       </a:r>
                     </a:p>
@@ -10513,14 +10505,14 @@
           <p:nvPr>
             <p:extLst>
               <p:ext uri="{D42A27DB-BD31-4B8C-83A1-F6EECF244321}">
-                <p14:modId xmlns:p14="http://schemas.microsoft.com/office/powerpoint/2010/main" val="3029262166"/>
+                <p14:modId xmlns:p14="http://schemas.microsoft.com/office/powerpoint/2010/main" val="2386451495"/>
               </p:ext>
             </p:extLst>
           </p:nvPr>
         </p:nvGraphicFramePr>
         <p:xfrm>
-          <a:off x="6591159" y="230941"/>
-          <a:ext cx="5220000" cy="868680"/>
+          <a:off x="6228659" y="191936"/>
+          <a:ext cx="5826240" cy="914400"/>
         </p:xfrm>
         <a:graphic>
           <a:graphicData uri="http://schemas.openxmlformats.org/drawingml/2006/table">
@@ -10536,14 +10528,14 @@
                     </a:ext>
                   </a:extLst>
                 </a:gridCol>
-                <a:gridCol w="612000">
+                <a:gridCol w="731520">
                   <a:extLst>
                     <a:ext uri="{9D8B030D-6E8A-4147-A177-3AD203B41FA5}">
                       <a16:colId xmlns:a16="http://schemas.microsoft.com/office/drawing/2014/main" val="426556918"/>
                     </a:ext>
                   </a:extLst>
                 </a:gridCol>
-                <a:gridCol w="612000">
+                <a:gridCol w="731520">
                   <a:extLst>
                     <a:ext uri="{9D8B030D-6E8A-4147-A177-3AD203B41FA5}">
                       <a16:colId xmlns:a16="http://schemas.microsoft.com/office/drawing/2014/main" val="2430018590"/>
@@ -10564,28 +10556,28 @@
                     </a:ext>
                   </a:extLst>
                 </a:gridCol>
-                <a:gridCol w="612000">
+                <a:gridCol w="731520">
                   <a:extLst>
                     <a:ext uri="{9D8B030D-6E8A-4147-A177-3AD203B41FA5}">
                       <a16:colId xmlns:a16="http://schemas.microsoft.com/office/drawing/2014/main" val="3188149243"/>
                     </a:ext>
                   </a:extLst>
                 </a:gridCol>
-                <a:gridCol w="612000">
+                <a:gridCol w="731520">
                   <a:extLst>
                     <a:ext uri="{9D8B030D-6E8A-4147-A177-3AD203B41FA5}">
                       <a16:colId xmlns:a16="http://schemas.microsoft.com/office/drawing/2014/main" val="2644231748"/>
                     </a:ext>
                   </a:extLst>
                 </a:gridCol>
-                <a:gridCol w="576000">
+                <a:gridCol w="640080">
                   <a:extLst>
                     <a:ext uri="{9D8B030D-6E8A-4147-A177-3AD203B41FA5}">
                       <a16:colId xmlns:a16="http://schemas.microsoft.com/office/drawing/2014/main" val="1050134289"/>
                     </a:ext>
                   </a:extLst>
                 </a:gridCol>
-                <a:gridCol w="576000">
+                <a:gridCol w="640080">
                   <a:extLst>
                     <a:ext uri="{9D8B030D-6E8A-4147-A177-3AD203B41FA5}">
                       <a16:colId xmlns:a16="http://schemas.microsoft.com/office/drawing/2014/main" val="1358950980"/>
@@ -11177,21 +11169,21 @@
                     <a:p>
                       <a:pPr algn="ctr"/>
                       <a:r>
-                        <a:rPr lang="en-US" sz="500" dirty="0"/>
+                        <a:rPr lang="en-US" sz="600" dirty="0"/>
                         <a:t>MSIO131PB4/</a:t>
                       </a:r>
                     </a:p>
                     <a:p>
                       <a:pPr algn="ctr"/>
                       <a:r>
-                        <a:rPr lang="en-US" sz="500" dirty="0"/>
+                        <a:rPr lang="en-US" sz="600" dirty="0"/>
                         <a:t>GB11/</a:t>
                       </a:r>
                     </a:p>
                     <a:p>
                       <a:pPr algn="ctr"/>
                       <a:r>
-                        <a:rPr lang="en-US" sz="500" dirty="0"/>
+                        <a:rPr lang="en-US" sz="600" dirty="0"/>
                         <a:t>VCCC_SE0_CLK1</a:t>
                       </a:r>
                     </a:p>
@@ -11225,7 +11217,7 @@
                         <a:defRPr/>
                       </a:pPr>
                       <a:r>
-                        <a:rPr lang="en-US" sz="500" dirty="0"/>
+                        <a:rPr lang="en-US" sz="600" dirty="0"/>
                         <a:t>MSIO129PB4/</a:t>
                       </a:r>
                     </a:p>
@@ -11248,7 +11240,7 @@
                         <a:defRPr/>
                       </a:pPr>
                       <a:r>
-                        <a:rPr lang="en-US" sz="500" dirty="0"/>
+                        <a:rPr lang="en-US" sz="600" dirty="0"/>
                         <a:t>CCC_SW1_CLKI3</a:t>
                       </a:r>
                     </a:p>
@@ -11282,7 +11274,7 @@
                         <a:defRPr/>
                       </a:pPr>
                       <a:r>
-                        <a:rPr lang="en-US" sz="500" dirty="0"/>
+                        <a:rPr lang="en-US" sz="600" dirty="0"/>
                         <a:t>MSIO129NB4</a:t>
                       </a:r>
                     </a:p>
@@ -11316,7 +11308,7 @@
                         <a:defRPr/>
                       </a:pPr>
                       <a:r>
-                        <a:rPr lang="en-US" sz="500" dirty="0"/>
+                        <a:rPr lang="en-US" sz="600" dirty="0"/>
                         <a:t>MSIO126NB4</a:t>
                       </a:r>
                     </a:p>
@@ -11334,21 +11326,21 @@
                     <a:p>
                       <a:pPr algn="ctr"/>
                       <a:r>
-                        <a:rPr lang="en-US" sz="500" dirty="0"/>
+                        <a:rPr lang="en-US" sz="600" dirty="0"/>
                         <a:t>MSIO131PB4/</a:t>
                       </a:r>
                     </a:p>
                     <a:p>
                       <a:pPr algn="ctr"/>
                       <a:r>
-                        <a:rPr lang="en-US" sz="500" dirty="0"/>
+                        <a:rPr lang="en-US" sz="600" dirty="0"/>
                         <a:t>GB11/</a:t>
                       </a:r>
                     </a:p>
                     <a:p>
                       <a:pPr algn="ctr"/>
                       <a:r>
-                        <a:rPr lang="en-US" sz="500" dirty="0"/>
+                        <a:rPr lang="en-US" sz="600" dirty="0"/>
                         <a:t>VCCC_SE0_CLK1</a:t>
                       </a:r>
                     </a:p>
@@ -11366,21 +11358,21 @@
                     <a:p>
                       <a:pPr algn="ctr"/>
                       <a:r>
-                        <a:rPr lang="en-US" sz="500" dirty="0"/>
+                        <a:rPr lang="en-US" sz="600" dirty="0"/>
                         <a:t>MSIO131PB4/</a:t>
                       </a:r>
                     </a:p>
                     <a:p>
                       <a:pPr algn="ctr"/>
                       <a:r>
-                        <a:rPr lang="en-US" sz="500" dirty="0"/>
+                        <a:rPr lang="en-US" sz="600" dirty="0"/>
                         <a:t>GB11/</a:t>
                       </a:r>
                     </a:p>
                     <a:p>
                       <a:pPr algn="ctr"/>
                       <a:r>
-                        <a:rPr lang="en-US" sz="500" dirty="0"/>
+                        <a:rPr lang="en-US" sz="600" dirty="0"/>
                         <a:t>VCCC_SE0_CLK1</a:t>
                       </a:r>
                     </a:p>
@@ -11414,7 +11406,7 @@
                         <a:defRPr/>
                       </a:pPr>
                       <a:r>
-                        <a:rPr lang="en-US" sz="500" dirty="0"/>
+                        <a:rPr lang="en-US" sz="600" dirty="0"/>
                         <a:t>MSIO121NB4/</a:t>
                       </a:r>
                     </a:p>
@@ -11437,7 +11429,7 @@
                         <a:defRPr/>
                       </a:pPr>
                       <a:r>
-                        <a:rPr lang="en-US" sz="500" dirty="0"/>
+                        <a:rPr lang="en-US" sz="600" dirty="0"/>
                         <a:t>PROBE_B</a:t>
                       </a:r>
                     </a:p>
@@ -11471,7 +11463,7 @@
                         <a:defRPr/>
                       </a:pPr>
                       <a:r>
-                        <a:rPr lang="en-US" sz="500" dirty="0"/>
+                        <a:rPr lang="en-US" sz="600" dirty="0"/>
                         <a:t>MSIO121PB4/</a:t>
                       </a:r>
                     </a:p>
@@ -11494,7 +11486,7 @@
                         <a:defRPr/>
                       </a:pPr>
                       <a:r>
-                        <a:rPr lang="en-US" sz="500" dirty="0"/>
+                        <a:rPr lang="en-US" sz="600" dirty="0"/>
                         <a:t>PROBE_A</a:t>
                       </a:r>
                     </a:p>
@@ -11529,7 +11521,7 @@
         </p:nvSpPr>
         <p:spPr>
           <a:xfrm>
-            <a:off x="5082942" y="2316924"/>
+            <a:off x="4155663" y="2327798"/>
             <a:ext cx="349906" cy="328578"/>
           </a:xfrm>
           <a:prstGeom prst="rect">
@@ -11581,7 +11573,7 @@
         </p:nvSpPr>
         <p:spPr>
           <a:xfrm>
-            <a:off x="5075685" y="2128299"/>
+            <a:off x="4148406" y="2139173"/>
             <a:ext cx="377026" cy="184666"/>
           </a:xfrm>
           <a:prstGeom prst="rect">
@@ -11606,64 +11598,6 @@
           </a:p>
         </p:txBody>
       </p:sp>
-      <p:pic>
-        <p:nvPicPr>
-          <p:cNvPr id="106" name="Picture 105">
-            <a:extLst>
-              <a:ext uri="{FF2B5EF4-FFF2-40B4-BE49-F238E27FC236}">
-                <a16:creationId xmlns:a16="http://schemas.microsoft.com/office/drawing/2014/main" id="{76A51AF9-95DD-4B86-8424-FC6A82F479D7}"/>
-              </a:ext>
-            </a:extLst>
-          </p:cNvPr>
-          <p:cNvPicPr>
-            <a:picLocks noChangeAspect="1"/>
-          </p:cNvPicPr>
-          <p:nvPr/>
-        </p:nvPicPr>
-        <p:blipFill rotWithShape="1">
-          <a:blip r:embed="rId4"/>
-          <a:srcRect l="4429" t="8799" b="2530"/>
-          <a:stretch/>
-        </p:blipFill>
-        <p:spPr>
-          <a:xfrm>
-            <a:off x="299720" y="4384316"/>
-            <a:ext cx="2672681" cy="956077"/>
-          </a:xfrm>
-          <a:prstGeom prst="rect">
-            <a:avLst/>
-          </a:prstGeom>
-        </p:spPr>
-      </p:pic>
-      <p:pic>
-        <p:nvPicPr>
-          <p:cNvPr id="87" name="Picture 86">
-            <a:extLst>
-              <a:ext uri="{FF2B5EF4-FFF2-40B4-BE49-F238E27FC236}">
-                <a16:creationId xmlns:a16="http://schemas.microsoft.com/office/drawing/2014/main" id="{AFF4764A-14A0-42C4-99F8-A19C5F034A65}"/>
-              </a:ext>
-            </a:extLst>
-          </p:cNvPr>
-          <p:cNvPicPr>
-            <a:picLocks noChangeAspect="1"/>
-          </p:cNvPicPr>
-          <p:nvPr/>
-        </p:nvPicPr>
-        <p:blipFill rotWithShape="1">
-          <a:blip r:embed="rId5"/>
-          <a:srcRect t="7509" b="8799"/>
-          <a:stretch/>
-        </p:blipFill>
-        <p:spPr>
-          <a:xfrm>
-            <a:off x="280185" y="2094663"/>
-            <a:ext cx="1985010" cy="2008859"/>
-          </a:xfrm>
-          <a:prstGeom prst="rect">
-            <a:avLst/>
-          </a:prstGeom>
-        </p:spPr>
-      </p:pic>
     </p:spTree>
     <p:extLst>
       <p:ext uri="{BB962C8B-B14F-4D97-AF65-F5344CB8AC3E}">

</xml_diff>

<commit_message>
Created repo for IO testing and some cleaning
</commit_message>
<xml_diff>
--- a/FPGA Pins.pptx
+++ b/FPGA Pins.pptx
@@ -218,7 +218,7 @@
           <a:p>
             <a:fld id="{A1D86082-5ED5-4107-A5A9-98A617540F08}" type="datetimeFigureOut">
               <a:rPr lang="en-US" smtClean="0"/>
-              <a:t>12/4/2020</a:t>
+              <a:t>2/8/2021</a:t>
             </a:fld>
             <a:endParaRPr lang="en-US"/>
           </a:p>
@@ -716,7 +716,7 @@
           <a:p>
             <a:fld id="{623ED2CB-424D-41FD-8670-8FE72FA18CA2}" type="datetimeFigureOut">
               <a:rPr lang="en-US" smtClean="0"/>
-              <a:t>12/4/2020</a:t>
+              <a:t>2/8/2021</a:t>
             </a:fld>
             <a:endParaRPr lang="en-US"/>
           </a:p>
@@ -914,7 +914,7 @@
           <a:p>
             <a:fld id="{623ED2CB-424D-41FD-8670-8FE72FA18CA2}" type="datetimeFigureOut">
               <a:rPr lang="en-US" smtClean="0"/>
-              <a:t>12/4/2020</a:t>
+              <a:t>2/8/2021</a:t>
             </a:fld>
             <a:endParaRPr lang="en-US"/>
           </a:p>
@@ -1122,7 +1122,7 @@
           <a:p>
             <a:fld id="{623ED2CB-424D-41FD-8670-8FE72FA18CA2}" type="datetimeFigureOut">
               <a:rPr lang="en-US" smtClean="0"/>
-              <a:t>12/4/2020</a:t>
+              <a:t>2/8/2021</a:t>
             </a:fld>
             <a:endParaRPr lang="en-US"/>
           </a:p>
@@ -1320,7 +1320,7 @@
           <a:p>
             <a:fld id="{623ED2CB-424D-41FD-8670-8FE72FA18CA2}" type="datetimeFigureOut">
               <a:rPr lang="en-US" smtClean="0"/>
-              <a:t>12/4/2020</a:t>
+              <a:t>2/8/2021</a:t>
             </a:fld>
             <a:endParaRPr lang="en-US"/>
           </a:p>
@@ -1595,7 +1595,7 @@
           <a:p>
             <a:fld id="{623ED2CB-424D-41FD-8670-8FE72FA18CA2}" type="datetimeFigureOut">
               <a:rPr lang="en-US" smtClean="0"/>
-              <a:t>12/4/2020</a:t>
+              <a:t>2/8/2021</a:t>
             </a:fld>
             <a:endParaRPr lang="en-US"/>
           </a:p>
@@ -1860,7 +1860,7 @@
           <a:p>
             <a:fld id="{623ED2CB-424D-41FD-8670-8FE72FA18CA2}" type="datetimeFigureOut">
               <a:rPr lang="en-US" smtClean="0"/>
-              <a:t>12/4/2020</a:t>
+              <a:t>2/8/2021</a:t>
             </a:fld>
             <a:endParaRPr lang="en-US"/>
           </a:p>
@@ -2272,7 +2272,7 @@
           <a:p>
             <a:fld id="{623ED2CB-424D-41FD-8670-8FE72FA18CA2}" type="datetimeFigureOut">
               <a:rPr lang="en-US" smtClean="0"/>
-              <a:t>12/4/2020</a:t>
+              <a:t>2/8/2021</a:t>
             </a:fld>
             <a:endParaRPr lang="en-US"/>
           </a:p>
@@ -2413,7 +2413,7 @@
           <a:p>
             <a:fld id="{623ED2CB-424D-41FD-8670-8FE72FA18CA2}" type="datetimeFigureOut">
               <a:rPr lang="en-US" smtClean="0"/>
-              <a:t>12/4/2020</a:t>
+              <a:t>2/8/2021</a:t>
             </a:fld>
             <a:endParaRPr lang="en-US"/>
           </a:p>
@@ -2526,7 +2526,7 @@
           <a:p>
             <a:fld id="{623ED2CB-424D-41FD-8670-8FE72FA18CA2}" type="datetimeFigureOut">
               <a:rPr lang="en-US" smtClean="0"/>
-              <a:t>12/4/2020</a:t>
+              <a:t>2/8/2021</a:t>
             </a:fld>
             <a:endParaRPr lang="en-US"/>
           </a:p>
@@ -2837,7 +2837,7 @@
           <a:p>
             <a:fld id="{623ED2CB-424D-41FD-8670-8FE72FA18CA2}" type="datetimeFigureOut">
               <a:rPr lang="en-US" smtClean="0"/>
-              <a:t>12/4/2020</a:t>
+              <a:t>2/8/2021</a:t>
             </a:fld>
             <a:endParaRPr lang="en-US"/>
           </a:p>
@@ -3125,7 +3125,7 @@
           <a:p>
             <a:fld id="{623ED2CB-424D-41FD-8670-8FE72FA18CA2}" type="datetimeFigureOut">
               <a:rPr lang="en-US" smtClean="0"/>
-              <a:t>12/4/2020</a:t>
+              <a:t>2/8/2021</a:t>
             </a:fld>
             <a:endParaRPr lang="en-US"/>
           </a:p>
@@ -3366,7 +3366,7 @@
           <a:p>
             <a:fld id="{623ED2CB-424D-41FD-8670-8FE72FA18CA2}" type="datetimeFigureOut">
               <a:rPr lang="en-US" smtClean="0"/>
-              <a:t>12/4/2020</a:t>
+              <a:t>2/8/2021</a:t>
             </a:fld>
             <a:endParaRPr lang="en-US"/>
           </a:p>
@@ -10505,7 +10505,7 @@
           <p:nvPr>
             <p:extLst>
               <p:ext uri="{D42A27DB-BD31-4B8C-83A1-F6EECF244321}">
-                <p14:modId xmlns:p14="http://schemas.microsoft.com/office/powerpoint/2010/main" val="2386451495"/>
+                <p14:modId xmlns:p14="http://schemas.microsoft.com/office/powerpoint/2010/main" val="910706457"/>
               </p:ext>
             </p:extLst>
           </p:nvPr>
@@ -10983,7 +10983,7 @@
                       <a:pPr algn="ctr"/>
                       <a:r>
                         <a:rPr lang="en-US" sz="600" dirty="0"/>
-                        <a:t>FPGA Pin</a:t>
+                        <a:t>FPGA</a:t>
                       </a:r>
                     </a:p>
                   </a:txBody>

</xml_diff>